<commit_message>
Deployed 786ab6a with MkDocs version: 1.1.2
</commit_message>
<xml_diff>
--- a/aulas/16-entrada-saida/slides.pptx
+++ b/aulas/16-entrada-saida/slides.pptx
@@ -10706,7 +10706,7 @@
                 <a:latin typeface="Verdana"/>
                 <a:ea typeface="Verdana"/>
               </a:rPr>
-              <a:t>Aula 15 - Entrada e Saída</a:t>
+              <a:t>Aula 16 - Entrada e Saída</a:t>
             </a:r>
             <a:endParaRPr lang="pt-BR" sz="2000" b="0" strike="noStrike" spc="0">
               <a:latin typeface="Arial"/>
@@ -21720,7 +21720,7 @@
         </p:nvSpPr>
         <p:spPr bwMode="auto">
           <a:xfrm>
-            <a:off x="5039998" y="3347998"/>
+            <a:off x="5039998" y="3347997"/>
             <a:ext cx="1377716" cy="315717"/>
           </a:xfrm>
           <a:prstGeom prst="rect">

</xml_diff>